<commit_message>
continue to add developers guide
</commit_message>
<xml_diff>
--- a/sphinx/source/flowcharts.pptx
+++ b/sphinx/source/flowcharts.pptx
@@ -5,13 +5,14 @@
     <p:sldMasterId id="2147483648" r:id="rId1"/>
   </p:sldMasterIdLst>
   <p:notesMasterIdLst>
-    <p:notesMasterId r:id="rId6"/>
+    <p:notesMasterId r:id="rId7"/>
   </p:notesMasterIdLst>
   <p:sldIdLst>
     <p:sldId id="258" r:id="rId2"/>
     <p:sldId id="261" r:id="rId3"/>
     <p:sldId id="257" r:id="rId4"/>
     <p:sldId id="259" r:id="rId5"/>
+    <p:sldId id="342" r:id="rId6"/>
   </p:sldIdLst>
   <p:sldSz cx="12192000" cy="6858000"/>
   <p:notesSz cx="6858000" cy="9144000"/>
@@ -200,7 +201,7 @@
           <a:p>
             <a:fld id="{AD4D1103-F798-0346-9F60-D6F20F8F830F}" type="datetimeFigureOut">
               <a:rPr lang="en-US" smtClean="0"/>
-              <a:t>1/22/22</a:t>
+              <a:t>7/6/22</a:t>
             </a:fld>
             <a:endParaRPr lang="en-US"/>
           </a:p>
@@ -551,6 +552,251 @@
 </p:notes>
 </file>
 
+<file path=ppt/notesSlides/notesSlide2.xml><?xml version="1.0" encoding="utf-8"?>
+<p:notes xmlns:a="http://schemas.openxmlformats.org/drawingml/2006/main" xmlns:r="http://schemas.openxmlformats.org/officeDocument/2006/relationships" xmlns:p="http://schemas.openxmlformats.org/presentationml/2006/main">
+  <p:cSld>
+    <p:spTree>
+      <p:nvGrpSpPr>
+        <p:cNvPr id="1" name=""/>
+        <p:cNvGrpSpPr/>
+        <p:nvPr/>
+      </p:nvGrpSpPr>
+      <p:grpSpPr>
+        <a:xfrm>
+          <a:off x="0" y="0"/>
+          <a:ext cx="0" cy="0"/>
+          <a:chOff x="0" y="0"/>
+          <a:chExt cx="0" cy="0"/>
+        </a:xfrm>
+      </p:grpSpPr>
+      <p:sp>
+        <p:nvSpPr>
+          <p:cNvPr id="40962" name="Rectangle 7"/>
+          <p:cNvSpPr>
+            <a:spLocks noGrp="1" noChangeArrowheads="1"/>
+          </p:cNvSpPr>
+          <p:nvPr>
+            <p:ph type="sldNum" sz="quarter" idx="5"/>
+          </p:nvPr>
+        </p:nvSpPr>
+        <p:spPr>
+          <a:noFill/>
+          <a:ln/>
+          <a:extLst>
+            <a:ext uri="{909E8E84-426E-40dd-AFC4-6F175D3DCCD1}">
+              <a14:hiddenFill xmlns:a14="http://schemas.microsoft.com/office/drawing/2010/main" xmlns="">
+                <a:solidFill>
+                  <a:srgbClr val="FFFFFF"/>
+                </a:solidFill>
+              </a14:hiddenFill>
+            </a:ext>
+            <a:ext uri="{91240B29-F687-4f45-9708-019B960494DF}">
+              <a14:hiddenLine xmlns:a14="http://schemas.microsoft.com/office/drawing/2010/main" xmlns="" w="9525">
+                <a:solidFill>
+                  <a:srgbClr val="000000"/>
+                </a:solidFill>
+                <a:miter lim="800000"/>
+                <a:headEnd/>
+                <a:tailEnd/>
+              </a14:hiddenLine>
+            </a:ext>
+          </a:extLst>
+        </p:spPr>
+        <p:txBody>
+          <a:bodyPr/>
+          <a:lstStyle>
+            <a:lvl1pPr>
+              <a:defRPr sz="2000">
+                <a:solidFill>
+                  <a:srgbClr val="000066"/>
+                </a:solidFill>
+                <a:latin typeface="Arial" charset="0"/>
+                <a:ea typeface="ヒラギノ角ゴ Pro W3" charset="0"/>
+                <a:cs typeface="ヒラギノ角ゴ Pro W3" charset="0"/>
+              </a:defRPr>
+            </a:lvl1pPr>
+            <a:lvl2pPr marL="38561392" indent="-38096602">
+              <a:defRPr sz="2000">
+                <a:solidFill>
+                  <a:srgbClr val="000066"/>
+                </a:solidFill>
+                <a:latin typeface="Arial" charset="0"/>
+                <a:ea typeface="ヒラギノ角ゴ Pro W3" charset="0"/>
+                <a:cs typeface="ヒラギノ角ゴ Pro W3" charset="0"/>
+              </a:defRPr>
+            </a:lvl2pPr>
+            <a:lvl3pPr>
+              <a:defRPr sz="2000">
+                <a:solidFill>
+                  <a:srgbClr val="000066"/>
+                </a:solidFill>
+                <a:latin typeface="Arial" charset="0"/>
+                <a:ea typeface="ヒラギノ角ゴ Pro W3" charset="0"/>
+                <a:cs typeface="ヒラギノ角ゴ Pro W3" charset="0"/>
+              </a:defRPr>
+            </a:lvl3pPr>
+            <a:lvl4pPr>
+              <a:defRPr sz="2000">
+                <a:solidFill>
+                  <a:srgbClr val="000066"/>
+                </a:solidFill>
+                <a:latin typeface="Arial" charset="0"/>
+                <a:ea typeface="ヒラギノ角ゴ Pro W3" charset="0"/>
+                <a:cs typeface="ヒラギノ角ゴ Pro W3" charset="0"/>
+              </a:defRPr>
+            </a:lvl4pPr>
+            <a:lvl5pPr>
+              <a:defRPr sz="2000">
+                <a:solidFill>
+                  <a:srgbClr val="000066"/>
+                </a:solidFill>
+                <a:latin typeface="Arial" charset="0"/>
+                <a:ea typeface="ヒラギノ角ゴ Pro W3" charset="0"/>
+                <a:cs typeface="ヒラギノ角ゴ Pro W3" charset="0"/>
+              </a:defRPr>
+            </a:lvl5pPr>
+            <a:lvl6pPr marL="464790" eaLnBrk="0" fontAlgn="base" hangingPunct="0">
+              <a:spcBef>
+                <a:spcPct val="0"/>
+              </a:spcBef>
+              <a:spcAft>
+                <a:spcPct val="0"/>
+              </a:spcAft>
+              <a:defRPr sz="2000">
+                <a:solidFill>
+                  <a:srgbClr val="000066"/>
+                </a:solidFill>
+                <a:latin typeface="Arial" charset="0"/>
+                <a:ea typeface="ヒラギノ角ゴ Pro W3" charset="0"/>
+                <a:cs typeface="ヒラギノ角ゴ Pro W3" charset="0"/>
+              </a:defRPr>
+            </a:lvl6pPr>
+            <a:lvl7pPr marL="929579" eaLnBrk="0" fontAlgn="base" hangingPunct="0">
+              <a:spcBef>
+                <a:spcPct val="0"/>
+              </a:spcBef>
+              <a:spcAft>
+                <a:spcPct val="0"/>
+              </a:spcAft>
+              <a:defRPr sz="2000">
+                <a:solidFill>
+                  <a:srgbClr val="000066"/>
+                </a:solidFill>
+                <a:latin typeface="Arial" charset="0"/>
+                <a:ea typeface="ヒラギノ角ゴ Pro W3" charset="0"/>
+                <a:cs typeface="ヒラギノ角ゴ Pro W3" charset="0"/>
+              </a:defRPr>
+            </a:lvl7pPr>
+            <a:lvl8pPr marL="1394369" eaLnBrk="0" fontAlgn="base" hangingPunct="0">
+              <a:spcBef>
+                <a:spcPct val="0"/>
+              </a:spcBef>
+              <a:spcAft>
+                <a:spcPct val="0"/>
+              </a:spcAft>
+              <a:defRPr sz="2000">
+                <a:solidFill>
+                  <a:srgbClr val="000066"/>
+                </a:solidFill>
+                <a:latin typeface="Arial" charset="0"/>
+                <a:ea typeface="ヒラギノ角ゴ Pro W3" charset="0"/>
+                <a:cs typeface="ヒラギノ角ゴ Pro W3" charset="0"/>
+              </a:defRPr>
+            </a:lvl8pPr>
+            <a:lvl9pPr marL="1859158" eaLnBrk="0" fontAlgn="base" hangingPunct="0">
+              <a:spcBef>
+                <a:spcPct val="0"/>
+              </a:spcBef>
+              <a:spcAft>
+                <a:spcPct val="0"/>
+              </a:spcAft>
+              <a:defRPr sz="2000">
+                <a:solidFill>
+                  <a:srgbClr val="000066"/>
+                </a:solidFill>
+                <a:latin typeface="Arial" charset="0"/>
+                <a:ea typeface="ヒラギノ角ゴ Pro W3" charset="0"/>
+                <a:cs typeface="ヒラギノ角ゴ Pro W3" charset="0"/>
+              </a:defRPr>
+            </a:lvl9pPr>
+          </a:lstStyle>
+          <a:p>
+            <a:fld id="{588D74AB-11AA-4E4A-A7F1-327C6B8BF668}" type="slidenum">
+              <a:rPr lang="en-US" sz="1200"/>
+              <a:pPr/>
+              <a:t>5</a:t>
+            </a:fld>
+            <a:endParaRPr lang="en-US" sz="1200"/>
+          </a:p>
+        </p:txBody>
+      </p:sp>
+      <p:sp>
+        <p:nvSpPr>
+          <p:cNvPr id="40963" name="Rectangle 2"/>
+          <p:cNvSpPr>
+            <a:spLocks noGrp="1" noRot="1" noChangeAspect="1" noChangeArrowheads="1" noTextEdit="1"/>
+          </p:cNvSpPr>
+          <p:nvPr>
+            <p:ph type="sldImg"/>
+          </p:nvPr>
+        </p:nvSpPr>
+        <p:spPr>
+          <a:solidFill>
+            <a:srgbClr val="FFFFFF"/>
+          </a:solidFill>
+          <a:ln/>
+        </p:spPr>
+      </p:sp>
+      <p:sp>
+        <p:nvSpPr>
+          <p:cNvPr id="40964" name="Rectangle 3"/>
+          <p:cNvSpPr>
+            <a:spLocks noGrp="1" noChangeArrowheads="1"/>
+          </p:cNvSpPr>
+          <p:nvPr>
+            <p:ph type="body" idx="1"/>
+          </p:nvPr>
+        </p:nvSpPr>
+        <p:spPr>
+          <a:solidFill>
+            <a:srgbClr val="FFFFFF"/>
+          </a:solidFill>
+          <a:ln>
+            <a:solidFill>
+              <a:srgbClr val="000000"/>
+            </a:solidFill>
+          </a:ln>
+          <a:extLst>
+            <a:ext uri="{FAA26D3D-D897-4be2-8F04-BA451C77F1D7}">
+              <ma14:placeholderFlag xmlns:ma14="http://schemas.microsoft.com/office/mac/drawingml/2011/main" xmlns="" val="1"/>
+            </a:ext>
+          </a:extLst>
+        </p:spPr>
+        <p:txBody>
+          <a:bodyPr/>
+          <a:lstStyle/>
+          <a:p>
+            <a:pPr eaLnBrk="1" hangingPunct="1"/>
+            <a:endParaRPr lang="en-US">
+              <a:ea typeface="ヒラギノ角ゴ Pro W3" charset="0"/>
+              <a:cs typeface="ヒラギノ角ゴ Pro W3" charset="0"/>
+            </a:endParaRPr>
+          </a:p>
+        </p:txBody>
+      </p:sp>
+    </p:spTree>
+    <p:extLst>
+      <p:ext uri="{BB962C8B-B14F-4D97-AF65-F5344CB8AC3E}">
+        <p14:creationId xmlns:p14="http://schemas.microsoft.com/office/powerpoint/2010/main" val="631725375"/>
+      </p:ext>
+    </p:extLst>
+  </p:cSld>
+  <p:clrMapOvr>
+    <a:masterClrMapping/>
+  </p:clrMapOvr>
+</p:notes>
+</file>
+
 <file path=ppt/slideLayouts/slideLayout1.xml><?xml version="1.0" encoding="utf-8"?>
 <p:sldLayout xmlns:a="http://schemas.openxmlformats.org/drawingml/2006/main" xmlns:r="http://schemas.openxmlformats.org/officeDocument/2006/relationships" xmlns:p="http://schemas.openxmlformats.org/presentationml/2006/main" type="title" preserve="1">
   <p:cSld name="Title Slide">
@@ -698,7 +944,7 @@
           <a:p>
             <a:fld id="{241FEBC1-29A5-DA4C-B508-A6E96D6A9B21}" type="datetimeFigureOut">
               <a:rPr lang="en-US" smtClean="0"/>
-              <a:t>1/22/22</a:t>
+              <a:t>7/6/22</a:t>
             </a:fld>
             <a:endParaRPr lang="en-US"/>
           </a:p>
@@ -896,7 +1142,7 @@
           <a:p>
             <a:fld id="{241FEBC1-29A5-DA4C-B508-A6E96D6A9B21}" type="datetimeFigureOut">
               <a:rPr lang="en-US" smtClean="0"/>
-              <a:t>1/22/22</a:t>
+              <a:t>7/6/22</a:t>
             </a:fld>
             <a:endParaRPr lang="en-US"/>
           </a:p>
@@ -1104,7 +1350,7 @@
           <a:p>
             <a:fld id="{241FEBC1-29A5-DA4C-B508-A6E96D6A9B21}" type="datetimeFigureOut">
               <a:rPr lang="en-US" smtClean="0"/>
-              <a:t>1/22/22</a:t>
+              <a:t>7/6/22</a:t>
             </a:fld>
             <a:endParaRPr lang="en-US"/>
           </a:p>
@@ -1168,6 +1414,175 @@
     <p:extLst>
       <p:ext uri="{BB962C8B-B14F-4D97-AF65-F5344CB8AC3E}">
         <p14:creationId xmlns:p14="http://schemas.microsoft.com/office/powerpoint/2010/main" val="2671934394"/>
+      </p:ext>
+    </p:extLst>
+  </p:cSld>
+  <p:clrMapOvr>
+    <a:masterClrMapping/>
+  </p:clrMapOvr>
+</p:sldLayout>
+</file>
+
+<file path=ppt/slideLayouts/slideLayout12.xml><?xml version="1.0" encoding="utf-8"?>
+<p:sldLayout xmlns:a="http://schemas.openxmlformats.org/drawingml/2006/main" xmlns:r="http://schemas.openxmlformats.org/officeDocument/2006/relationships" xmlns:p="http://schemas.openxmlformats.org/presentationml/2006/main" type="objAndTx">
+  <p:cSld name="Title, Content and Text">
+    <p:spTree>
+      <p:nvGrpSpPr>
+        <p:cNvPr id="1" name=""/>
+        <p:cNvGrpSpPr/>
+        <p:nvPr/>
+      </p:nvGrpSpPr>
+      <p:grpSpPr>
+        <a:xfrm>
+          <a:off x="0" y="0"/>
+          <a:ext cx="0" cy="0"/>
+          <a:chOff x="0" y="0"/>
+          <a:chExt cx="0" cy="0"/>
+        </a:xfrm>
+      </p:grpSpPr>
+      <p:sp>
+        <p:nvSpPr>
+          <p:cNvPr id="2" name="Title 1"/>
+          <p:cNvSpPr>
+            <a:spLocks noGrp="1"/>
+          </p:cNvSpPr>
+          <p:nvPr>
+            <p:ph type="title"/>
+          </p:nvPr>
+        </p:nvSpPr>
+        <p:spPr>
+          <a:xfrm>
+            <a:off x="1524000" y="228600"/>
+            <a:ext cx="9245600" cy="381000"/>
+          </a:xfrm>
+        </p:spPr>
+        <p:txBody>
+          <a:bodyPr/>
+          <a:lstStyle/>
+          <a:p>
+            <a:r>
+              <a:rPr lang="en-US"/>
+              <a:t>Click to edit Master title style</a:t>
+            </a:r>
+          </a:p>
+        </p:txBody>
+      </p:sp>
+      <p:sp>
+        <p:nvSpPr>
+          <p:cNvPr id="3" name="Content Placeholder 2"/>
+          <p:cNvSpPr>
+            <a:spLocks noGrp="1"/>
+          </p:cNvSpPr>
+          <p:nvPr>
+            <p:ph sz="half" idx="1"/>
+          </p:nvPr>
+        </p:nvSpPr>
+        <p:spPr>
+          <a:xfrm>
+            <a:off x="914400" y="1295400"/>
+            <a:ext cx="5181600" cy="4800600"/>
+          </a:xfrm>
+        </p:spPr>
+        <p:txBody>
+          <a:bodyPr/>
+          <a:lstStyle/>
+          <a:p>
+            <a:pPr lvl="0"/>
+            <a:r>
+              <a:rPr lang="en-US"/>
+              <a:t>Click to edit Master text styles</a:t>
+            </a:r>
+          </a:p>
+          <a:p>
+            <a:pPr lvl="1"/>
+            <a:r>
+              <a:rPr lang="en-US"/>
+              <a:t>Second level</a:t>
+            </a:r>
+          </a:p>
+          <a:p>
+            <a:pPr lvl="2"/>
+            <a:r>
+              <a:rPr lang="en-US"/>
+              <a:t>Third level</a:t>
+            </a:r>
+          </a:p>
+          <a:p>
+            <a:pPr lvl="3"/>
+            <a:r>
+              <a:rPr lang="en-US"/>
+              <a:t>Fourth level</a:t>
+            </a:r>
+          </a:p>
+          <a:p>
+            <a:pPr lvl="4"/>
+            <a:r>
+              <a:rPr lang="en-US"/>
+              <a:t>Fifth level</a:t>
+            </a:r>
+          </a:p>
+        </p:txBody>
+      </p:sp>
+      <p:sp>
+        <p:nvSpPr>
+          <p:cNvPr id="4" name="Text Placeholder 3"/>
+          <p:cNvSpPr>
+            <a:spLocks noGrp="1"/>
+          </p:cNvSpPr>
+          <p:nvPr>
+            <p:ph type="body" sz="half" idx="2"/>
+          </p:nvPr>
+        </p:nvSpPr>
+        <p:spPr>
+          <a:xfrm>
+            <a:off x="6299200" y="1295400"/>
+            <a:ext cx="5181600" cy="4800600"/>
+          </a:xfrm>
+        </p:spPr>
+        <p:txBody>
+          <a:bodyPr/>
+          <a:lstStyle/>
+          <a:p>
+            <a:pPr lvl="0"/>
+            <a:r>
+              <a:rPr lang="en-US"/>
+              <a:t>Click to edit Master text styles</a:t>
+            </a:r>
+          </a:p>
+          <a:p>
+            <a:pPr lvl="1"/>
+            <a:r>
+              <a:rPr lang="en-US"/>
+              <a:t>Second level</a:t>
+            </a:r>
+          </a:p>
+          <a:p>
+            <a:pPr lvl="2"/>
+            <a:r>
+              <a:rPr lang="en-US"/>
+              <a:t>Third level</a:t>
+            </a:r>
+          </a:p>
+          <a:p>
+            <a:pPr lvl="3"/>
+            <a:r>
+              <a:rPr lang="en-US"/>
+              <a:t>Fourth level</a:t>
+            </a:r>
+          </a:p>
+          <a:p>
+            <a:pPr lvl="4"/>
+            <a:r>
+              <a:rPr lang="en-US"/>
+              <a:t>Fifth level</a:t>
+            </a:r>
+          </a:p>
+        </p:txBody>
+      </p:sp>
+    </p:spTree>
+    <p:extLst>
+      <p:ext uri="{BB962C8B-B14F-4D97-AF65-F5344CB8AC3E}">
+        <p14:creationId xmlns:p14="http://schemas.microsoft.com/office/powerpoint/2010/main" val="1257288833"/>
       </p:ext>
     </p:extLst>
   </p:cSld>
@@ -1302,7 +1717,7 @@
           <a:p>
             <a:fld id="{241FEBC1-29A5-DA4C-B508-A6E96D6A9B21}" type="datetimeFigureOut">
               <a:rPr lang="en-US" smtClean="0"/>
-              <a:t>1/22/22</a:t>
+              <a:t>7/6/22</a:t>
             </a:fld>
             <a:endParaRPr lang="en-US"/>
           </a:p>
@@ -1577,7 +1992,7 @@
           <a:p>
             <a:fld id="{241FEBC1-29A5-DA4C-B508-A6E96D6A9B21}" type="datetimeFigureOut">
               <a:rPr lang="en-US" smtClean="0"/>
-              <a:t>1/22/22</a:t>
+              <a:t>7/6/22</a:t>
             </a:fld>
             <a:endParaRPr lang="en-US"/>
           </a:p>
@@ -1842,7 +2257,7 @@
           <a:p>
             <a:fld id="{241FEBC1-29A5-DA4C-B508-A6E96D6A9B21}" type="datetimeFigureOut">
               <a:rPr lang="en-US" smtClean="0"/>
-              <a:t>1/22/22</a:t>
+              <a:t>7/6/22</a:t>
             </a:fld>
             <a:endParaRPr lang="en-US"/>
           </a:p>
@@ -2254,7 +2669,7 @@
           <a:p>
             <a:fld id="{241FEBC1-29A5-DA4C-B508-A6E96D6A9B21}" type="datetimeFigureOut">
               <a:rPr lang="en-US" smtClean="0"/>
-              <a:t>1/22/22</a:t>
+              <a:t>7/6/22</a:t>
             </a:fld>
             <a:endParaRPr lang="en-US"/>
           </a:p>
@@ -2395,7 +2810,7 @@
           <a:p>
             <a:fld id="{241FEBC1-29A5-DA4C-B508-A6E96D6A9B21}" type="datetimeFigureOut">
               <a:rPr lang="en-US" smtClean="0"/>
-              <a:t>1/22/22</a:t>
+              <a:t>7/6/22</a:t>
             </a:fld>
             <a:endParaRPr lang="en-US"/>
           </a:p>
@@ -2508,7 +2923,7 @@
           <a:p>
             <a:fld id="{241FEBC1-29A5-DA4C-B508-A6E96D6A9B21}" type="datetimeFigureOut">
               <a:rPr lang="en-US" smtClean="0"/>
-              <a:t>1/22/22</a:t>
+              <a:t>7/6/22</a:t>
             </a:fld>
             <a:endParaRPr lang="en-US"/>
           </a:p>
@@ -2819,7 +3234,7 @@
           <a:p>
             <a:fld id="{241FEBC1-29A5-DA4C-B508-A6E96D6A9B21}" type="datetimeFigureOut">
               <a:rPr lang="en-US" smtClean="0"/>
-              <a:t>1/22/22</a:t>
+              <a:t>7/6/22</a:t>
             </a:fld>
             <a:endParaRPr lang="en-US"/>
           </a:p>
@@ -3107,7 +3522,7 @@
           <a:p>
             <a:fld id="{241FEBC1-29A5-DA4C-B508-A6E96D6A9B21}" type="datetimeFigureOut">
               <a:rPr lang="en-US" smtClean="0"/>
-              <a:t>1/22/22</a:t>
+              <a:t>7/6/22</a:t>
             </a:fld>
             <a:endParaRPr lang="en-US"/>
           </a:p>
@@ -3348,7 +3763,7 @@
           <a:p>
             <a:fld id="{241FEBC1-29A5-DA4C-B508-A6E96D6A9B21}" type="datetimeFigureOut">
               <a:rPr lang="en-US" smtClean="0"/>
-              <a:t>1/22/22</a:t>
+              <a:t>7/6/22</a:t>
             </a:fld>
             <a:endParaRPr lang="en-US"/>
           </a:p>
@@ -3464,6 +3879,7 @@
     <p:sldLayoutId id="2147483657" r:id="rId9"/>
     <p:sldLayoutId id="2147483658" r:id="rId10"/>
     <p:sldLayoutId id="2147483659" r:id="rId11"/>
+    <p:sldLayoutId id="2147483662" r:id="rId12"/>
   </p:sldLayoutIdLst>
   <p:txStyles>
     <p:titleStyle>
@@ -12695,6 +13111,1976 @@
     <p:extLst>
       <p:ext uri="{BB962C8B-B14F-4D97-AF65-F5344CB8AC3E}">
         <p14:creationId xmlns:p14="http://schemas.microsoft.com/office/powerpoint/2010/main" val="3759759220"/>
+      </p:ext>
+    </p:extLst>
+  </p:cSld>
+  <p:clrMapOvr>
+    <a:masterClrMapping/>
+  </p:clrMapOvr>
+</p:sld>
+</file>
+
+<file path=ppt/slides/slide5.xml><?xml version="1.0" encoding="utf-8"?>
+<p:sld xmlns:a="http://schemas.openxmlformats.org/drawingml/2006/main" xmlns:r="http://schemas.openxmlformats.org/officeDocument/2006/relationships" xmlns:p="http://schemas.openxmlformats.org/presentationml/2006/main">
+  <p:cSld>
+    <p:spTree>
+      <p:nvGrpSpPr>
+        <p:cNvPr id="1" name=""/>
+        <p:cNvGrpSpPr/>
+        <p:nvPr/>
+      </p:nvGrpSpPr>
+      <p:grpSpPr>
+        <a:xfrm>
+          <a:off x="0" y="0"/>
+          <a:ext cx="0" cy="0"/>
+          <a:chOff x="0" y="0"/>
+          <a:chExt cx="0" cy="0"/>
+        </a:xfrm>
+      </p:grpSpPr>
+      <p:sp>
+        <p:nvSpPr>
+          <p:cNvPr id="39940" name="Rectangle 3"/>
+          <p:cNvSpPr>
+            <a:spLocks noChangeArrowheads="1"/>
+          </p:cNvSpPr>
+          <p:nvPr/>
+        </p:nvSpPr>
+        <p:spPr bwMode="auto">
+          <a:xfrm>
+            <a:off x="4800600" y="990600"/>
+            <a:ext cx="1676400" cy="609600"/>
+          </a:xfrm>
+          <a:prstGeom prst="rect">
+            <a:avLst/>
+          </a:prstGeom>
+          <a:solidFill>
+            <a:schemeClr val="accent2"/>
+          </a:solidFill>
+          <a:ln w="9525">
+            <a:solidFill>
+              <a:schemeClr val="tx1"/>
+            </a:solidFill>
+            <a:miter lim="800000"/>
+            <a:headEnd/>
+            <a:tailEnd/>
+          </a:ln>
+        </p:spPr>
+        <p:txBody>
+          <a:bodyPr wrap="none" anchor="ctr"/>
+          <a:lstStyle/>
+          <a:p>
+            <a:pPr algn="ctr"/>
+            <a:r>
+              <a:rPr lang="en-US" sz="2400" dirty="0"/>
+              <a:t>Particles</a:t>
+            </a:r>
+          </a:p>
+        </p:txBody>
+      </p:sp>
+      <p:sp>
+        <p:nvSpPr>
+          <p:cNvPr id="39941" name="Rectangle 4"/>
+          <p:cNvSpPr>
+            <a:spLocks noChangeArrowheads="1"/>
+          </p:cNvSpPr>
+          <p:nvPr/>
+        </p:nvSpPr>
+        <p:spPr bwMode="auto">
+          <a:xfrm>
+            <a:off x="8273713" y="2133600"/>
+            <a:ext cx="2675021" cy="609600"/>
+          </a:xfrm>
+          <a:prstGeom prst="rect">
+            <a:avLst/>
+          </a:prstGeom>
+          <a:solidFill>
+            <a:schemeClr val="accent4"/>
+          </a:solidFill>
+          <a:ln w="9525">
+            <a:solidFill>
+              <a:schemeClr val="tx1"/>
+            </a:solidFill>
+            <a:miter lim="800000"/>
+            <a:headEnd/>
+            <a:tailEnd/>
+          </a:ln>
+        </p:spPr>
+        <p:txBody>
+          <a:bodyPr wrap="none" anchor="ctr"/>
+          <a:lstStyle/>
+          <a:p>
+            <a:r>
+              <a:rPr lang="en-US" sz="2400" dirty="0" err="1"/>
+              <a:t>ParticlesInitialization</a:t>
+            </a:r>
+            <a:endParaRPr lang="en-US" sz="2400" dirty="0"/>
+          </a:p>
+        </p:txBody>
+      </p:sp>
+      <p:sp>
+        <p:nvSpPr>
+          <p:cNvPr id="39942" name="Rectangle 5"/>
+          <p:cNvSpPr>
+            <a:spLocks noChangeArrowheads="1"/>
+          </p:cNvSpPr>
+          <p:nvPr/>
+        </p:nvSpPr>
+        <p:spPr bwMode="auto">
+          <a:xfrm>
+            <a:off x="4724392" y="2057400"/>
+            <a:ext cx="1828800" cy="609600"/>
+          </a:xfrm>
+          <a:prstGeom prst="rect">
+            <a:avLst/>
+          </a:prstGeom>
+          <a:solidFill>
+            <a:schemeClr val="accent4"/>
+          </a:solidFill>
+          <a:ln w="9525">
+            <a:solidFill>
+              <a:schemeClr val="tx1"/>
+            </a:solidFill>
+            <a:miter lim="800000"/>
+            <a:headEnd/>
+            <a:tailEnd/>
+          </a:ln>
+        </p:spPr>
+        <p:txBody>
+          <a:bodyPr wrap="none" anchor="ctr"/>
+          <a:lstStyle/>
+          <a:p>
+            <a:r>
+              <a:rPr lang="en-US" sz="2400" dirty="0" err="1"/>
+              <a:t>ParticlesMain</a:t>
+            </a:r>
+            <a:endParaRPr lang="en-US" sz="2400" dirty="0"/>
+          </a:p>
+        </p:txBody>
+      </p:sp>
+      <p:sp>
+        <p:nvSpPr>
+          <p:cNvPr id="39943" name="Rectangle 6"/>
+          <p:cNvSpPr>
+            <a:spLocks noChangeArrowheads="1"/>
+          </p:cNvSpPr>
+          <p:nvPr/>
+        </p:nvSpPr>
+        <p:spPr bwMode="auto">
+          <a:xfrm>
+            <a:off x="950492" y="2057400"/>
+            <a:ext cx="2450432" cy="609600"/>
+          </a:xfrm>
+          <a:prstGeom prst="rect">
+            <a:avLst/>
+          </a:prstGeom>
+          <a:solidFill>
+            <a:schemeClr val="accent4"/>
+          </a:solidFill>
+          <a:ln w="9525">
+            <a:solidFill>
+              <a:schemeClr val="tx1"/>
+            </a:solidFill>
+            <a:miter lim="800000"/>
+            <a:headEnd/>
+            <a:tailEnd/>
+          </a:ln>
+        </p:spPr>
+        <p:txBody>
+          <a:bodyPr wrap="none" anchor="ctr"/>
+          <a:lstStyle/>
+          <a:p>
+            <a:r>
+              <a:rPr lang="en-US" sz="2400" dirty="0" err="1"/>
+              <a:t>ParticlesMapping</a:t>
+            </a:r>
+            <a:endParaRPr lang="en-US" sz="2400" dirty="0"/>
+          </a:p>
+        </p:txBody>
+      </p:sp>
+      <p:cxnSp>
+        <p:nvCxnSpPr>
+          <p:cNvPr id="39944" name="AutoShape 7"/>
+          <p:cNvCxnSpPr>
+            <a:cxnSpLocks noChangeShapeType="1"/>
+            <a:stCxn id="39940" idx="2"/>
+            <a:endCxn id="39942" idx="0"/>
+          </p:cNvCxnSpPr>
+          <p:nvPr/>
+        </p:nvCxnSpPr>
+        <p:spPr bwMode="auto">
+          <a:xfrm flipH="1">
+            <a:off x="5638792" y="1600200"/>
+            <a:ext cx="8" cy="457200"/>
+          </a:xfrm>
+          <a:prstGeom prst="straightConnector1">
+            <a:avLst/>
+          </a:prstGeom>
+          <a:noFill/>
+          <a:ln w="31750">
+            <a:solidFill>
+              <a:schemeClr val="tx1"/>
+            </a:solidFill>
+            <a:round/>
+            <a:headEnd/>
+            <a:tailEnd type="triangle" w="med" len="med"/>
+          </a:ln>
+          <a:extLst>
+            <a:ext uri="{909E8E84-426E-40dd-AFC4-6F175D3DCCD1}">
+              <a14:hiddenFill xmlns:a14="http://schemas.microsoft.com/office/drawing/2010/main" xmlns="">
+                <a:noFill/>
+              </a14:hiddenFill>
+            </a:ext>
+          </a:extLst>
+        </p:spPr>
+      </p:cxnSp>
+      <p:cxnSp>
+        <p:nvCxnSpPr>
+          <p:cNvPr id="39945" name="AutoShape 8"/>
+          <p:cNvCxnSpPr>
+            <a:cxnSpLocks noChangeShapeType="1"/>
+            <a:stCxn id="39940" idx="1"/>
+            <a:endCxn id="39943" idx="0"/>
+          </p:cNvCxnSpPr>
+          <p:nvPr/>
+        </p:nvCxnSpPr>
+        <p:spPr bwMode="auto">
+          <a:xfrm rot="10800000" flipV="1">
+            <a:off x="2175708" y="1295400"/>
+            <a:ext cx="2624892" cy="762000"/>
+          </a:xfrm>
+          <a:prstGeom prst="bentConnector2">
+            <a:avLst/>
+          </a:prstGeom>
+          <a:noFill/>
+          <a:ln w="31750">
+            <a:solidFill>
+              <a:schemeClr val="tx1"/>
+            </a:solidFill>
+            <a:miter lim="800000"/>
+            <a:headEnd/>
+            <a:tailEnd type="triangle" w="med" len="med"/>
+          </a:ln>
+          <a:extLst>
+            <a:ext uri="{909E8E84-426E-40dd-AFC4-6F175D3DCCD1}">
+              <a14:hiddenFill xmlns:a14="http://schemas.microsoft.com/office/drawing/2010/main" xmlns="">
+                <a:noFill/>
+              </a14:hiddenFill>
+            </a:ext>
+          </a:extLst>
+        </p:spPr>
+      </p:cxnSp>
+      <p:cxnSp>
+        <p:nvCxnSpPr>
+          <p:cNvPr id="39946" name="AutoShape 9"/>
+          <p:cNvCxnSpPr>
+            <a:cxnSpLocks noChangeShapeType="1"/>
+            <a:stCxn id="39940" idx="3"/>
+            <a:endCxn id="39941" idx="0"/>
+          </p:cNvCxnSpPr>
+          <p:nvPr/>
+        </p:nvCxnSpPr>
+        <p:spPr bwMode="auto">
+          <a:xfrm>
+            <a:off x="6477000" y="1295400"/>
+            <a:ext cx="3134224" cy="838200"/>
+          </a:xfrm>
+          <a:prstGeom prst="bentConnector2">
+            <a:avLst/>
+          </a:prstGeom>
+          <a:noFill/>
+          <a:ln w="31750">
+            <a:solidFill>
+              <a:schemeClr val="tx1"/>
+            </a:solidFill>
+            <a:miter lim="800000"/>
+            <a:headEnd/>
+            <a:tailEnd type="triangle" w="med" len="med"/>
+          </a:ln>
+          <a:extLst>
+            <a:ext uri="{909E8E84-426E-40dd-AFC4-6F175D3DCCD1}">
+              <a14:hiddenFill xmlns:a14="http://schemas.microsoft.com/office/drawing/2010/main" xmlns="">
+                <a:noFill/>
+              </a14:hiddenFill>
+            </a:ext>
+          </a:extLst>
+        </p:spPr>
+      </p:cxnSp>
+      <p:sp>
+        <p:nvSpPr>
+          <p:cNvPr id="7" name="Oval 6">
+            <a:extLst>
+              <a:ext uri="{FF2B5EF4-FFF2-40B4-BE49-F238E27FC236}">
+                <a16:creationId xmlns:a16="http://schemas.microsoft.com/office/drawing/2014/main" id="{08566705-2EBD-35BC-A474-CB19FF6A8072}"/>
+              </a:ext>
+            </a:extLst>
+          </p:cNvPr>
+          <p:cNvSpPr/>
+          <p:nvPr/>
+        </p:nvSpPr>
+        <p:spPr>
+          <a:xfrm>
+            <a:off x="4463719" y="74194"/>
+            <a:ext cx="2362200" cy="685800"/>
+          </a:xfrm>
+          <a:prstGeom prst="ellipse">
+            <a:avLst/>
+          </a:prstGeom>
+          <a:solidFill>
+            <a:schemeClr val="bg2">
+              <a:lumMod val="50000"/>
+            </a:schemeClr>
+          </a:solidFill>
+        </p:spPr>
+        <p:style>
+          <a:lnRef idx="2">
+            <a:schemeClr val="accent1">
+              <a:shade val="50000"/>
+            </a:schemeClr>
+          </a:lnRef>
+          <a:fillRef idx="1">
+            <a:schemeClr val="accent1"/>
+          </a:fillRef>
+          <a:effectRef idx="0">
+            <a:schemeClr val="accent1"/>
+          </a:effectRef>
+          <a:fontRef idx="minor">
+            <a:schemeClr val="lt1"/>
+          </a:fontRef>
+        </p:style>
+        <p:txBody>
+          <a:bodyPr rtlCol="0" anchor="ctr"/>
+          <a:lstStyle/>
+          <a:p>
+            <a:pPr algn="ctr"/>
+            <a:r>
+              <a:rPr lang="en-US" dirty="0"/>
+              <a:t>source</a:t>
+            </a:r>
+          </a:p>
+        </p:txBody>
+      </p:sp>
+      <p:sp>
+        <p:nvSpPr>
+          <p:cNvPr id="51" name="Oval 50">
+            <a:extLst>
+              <a:ext uri="{FF2B5EF4-FFF2-40B4-BE49-F238E27FC236}">
+                <a16:creationId xmlns:a16="http://schemas.microsoft.com/office/drawing/2014/main" id="{EC0FAA66-1106-230C-BECE-6863F69D1FFF}"/>
+              </a:ext>
+            </a:extLst>
+          </p:cNvPr>
+          <p:cNvSpPr/>
+          <p:nvPr/>
+        </p:nvSpPr>
+        <p:spPr>
+          <a:xfrm>
+            <a:off x="4728408" y="3392906"/>
+            <a:ext cx="1828800" cy="685800"/>
+          </a:xfrm>
+          <a:prstGeom prst="ellipse">
+            <a:avLst/>
+          </a:prstGeom>
+          <a:solidFill>
+            <a:schemeClr val="bg2">
+              <a:lumMod val="50000"/>
+            </a:schemeClr>
+          </a:solidFill>
+        </p:spPr>
+        <p:style>
+          <a:lnRef idx="2">
+            <a:schemeClr val="accent1">
+              <a:shade val="50000"/>
+            </a:schemeClr>
+          </a:lnRef>
+          <a:fillRef idx="1">
+            <a:schemeClr val="accent1"/>
+          </a:fillRef>
+          <a:effectRef idx="0">
+            <a:schemeClr val="accent1"/>
+          </a:effectRef>
+          <a:fontRef idx="minor">
+            <a:schemeClr val="lt1"/>
+          </a:fontRef>
+        </p:style>
+        <p:txBody>
+          <a:bodyPr rtlCol="0" anchor="ctr"/>
+          <a:lstStyle/>
+          <a:p>
+            <a:pPr algn="ctr"/>
+            <a:r>
+              <a:rPr lang="en-US" dirty="0"/>
+              <a:t>passive</a:t>
+            </a:r>
+          </a:p>
+        </p:txBody>
+      </p:sp>
+      <p:sp>
+        <p:nvSpPr>
+          <p:cNvPr id="52" name="Rectangle 51">
+            <a:extLst>
+              <a:ext uri="{FF2B5EF4-FFF2-40B4-BE49-F238E27FC236}">
+                <a16:creationId xmlns:a16="http://schemas.microsoft.com/office/drawing/2014/main" id="{0844A840-A500-5233-10B6-ADFC078601BB}"/>
+              </a:ext>
+            </a:extLst>
+          </p:cNvPr>
+          <p:cNvSpPr/>
+          <p:nvPr/>
+        </p:nvSpPr>
+        <p:spPr>
+          <a:xfrm>
+            <a:off x="2352163" y="3108155"/>
+            <a:ext cx="1720518" cy="453191"/>
+          </a:xfrm>
+          <a:prstGeom prst="rect">
+            <a:avLst/>
+          </a:prstGeom>
+          <a:solidFill>
+            <a:schemeClr val="accent2">
+              <a:lumMod val="60000"/>
+              <a:lumOff val="40000"/>
+            </a:schemeClr>
+          </a:solidFill>
+        </p:spPr>
+        <p:style>
+          <a:lnRef idx="2">
+            <a:schemeClr val="accent1">
+              <a:shade val="50000"/>
+            </a:schemeClr>
+          </a:lnRef>
+          <a:fillRef idx="1">
+            <a:schemeClr val="accent1"/>
+          </a:fillRef>
+          <a:effectRef idx="0">
+            <a:schemeClr val="accent1"/>
+          </a:effectRef>
+          <a:fontRef idx="minor">
+            <a:schemeClr val="lt1"/>
+          </a:fontRef>
+        </p:style>
+        <p:txBody>
+          <a:bodyPr rtlCol="0" anchor="ctr"/>
+          <a:lstStyle/>
+          <a:p>
+            <a:pPr algn="ctr"/>
+            <a:r>
+              <a:rPr lang="en-US" dirty="0" err="1">
+                <a:solidFill>
+                  <a:schemeClr val="tx1"/>
+                </a:solidFill>
+              </a:rPr>
+              <a:t>ParticlesOwned</a:t>
+            </a:r>
+            <a:endParaRPr lang="en-US" dirty="0">
+              <a:solidFill>
+                <a:schemeClr val="tx1"/>
+              </a:solidFill>
+            </a:endParaRPr>
+          </a:p>
+        </p:txBody>
+      </p:sp>
+      <p:sp>
+        <p:nvSpPr>
+          <p:cNvPr id="53" name="Rectangle 52">
+            <a:extLst>
+              <a:ext uri="{FF2B5EF4-FFF2-40B4-BE49-F238E27FC236}">
+                <a16:creationId xmlns:a16="http://schemas.microsoft.com/office/drawing/2014/main" id="{DADE4AB9-00C0-15CF-7B2E-86D41C0D8C27}"/>
+              </a:ext>
+            </a:extLst>
+          </p:cNvPr>
+          <p:cNvSpPr/>
+          <p:nvPr/>
+        </p:nvSpPr>
+        <p:spPr>
+          <a:xfrm>
+            <a:off x="669742" y="3108155"/>
+            <a:ext cx="1483895" cy="453191"/>
+          </a:xfrm>
+          <a:prstGeom prst="rect">
+            <a:avLst/>
+          </a:prstGeom>
+          <a:solidFill>
+            <a:schemeClr val="accent2">
+              <a:lumMod val="60000"/>
+              <a:lumOff val="40000"/>
+            </a:schemeClr>
+          </a:solidFill>
+        </p:spPr>
+        <p:style>
+          <a:lnRef idx="2">
+            <a:schemeClr val="accent1">
+              <a:shade val="50000"/>
+            </a:schemeClr>
+          </a:lnRef>
+          <a:fillRef idx="1">
+            <a:schemeClr val="accent1"/>
+          </a:fillRef>
+          <a:effectRef idx="0">
+            <a:schemeClr val="accent1"/>
+          </a:effectRef>
+          <a:fontRef idx="minor">
+            <a:schemeClr val="lt1"/>
+          </a:fontRef>
+        </p:style>
+        <p:txBody>
+          <a:bodyPr rtlCol="0" anchor="ctr"/>
+          <a:lstStyle/>
+          <a:p>
+            <a:pPr algn="ctr"/>
+            <a:r>
+              <a:rPr lang="en-US" dirty="0" err="1">
+                <a:solidFill>
+                  <a:schemeClr val="tx1"/>
+                </a:solidFill>
+              </a:rPr>
+              <a:t>MeshOwned</a:t>
+            </a:r>
+            <a:endParaRPr lang="en-US" dirty="0">
+              <a:solidFill>
+                <a:schemeClr val="tx1"/>
+              </a:solidFill>
+            </a:endParaRPr>
+          </a:p>
+        </p:txBody>
+      </p:sp>
+      <p:sp>
+        <p:nvSpPr>
+          <p:cNvPr id="14" name="Rectangle 13">
+            <a:extLst>
+              <a:ext uri="{FF2B5EF4-FFF2-40B4-BE49-F238E27FC236}">
+                <a16:creationId xmlns:a16="http://schemas.microsoft.com/office/drawing/2014/main" id="{60185D2B-8B5E-9975-3407-76A53C89A80A}"/>
+              </a:ext>
+            </a:extLst>
+          </p:cNvPr>
+          <p:cNvSpPr/>
+          <p:nvPr/>
+        </p:nvSpPr>
+        <p:spPr>
+          <a:xfrm>
+            <a:off x="5078318" y="5763130"/>
+            <a:ext cx="1145012" cy="589547"/>
+          </a:xfrm>
+          <a:prstGeom prst="rect">
+            <a:avLst/>
+          </a:prstGeom>
+          <a:solidFill>
+            <a:schemeClr val="accent4">
+              <a:lumMod val="50000"/>
+            </a:schemeClr>
+          </a:solidFill>
+        </p:spPr>
+        <p:style>
+          <a:lnRef idx="2">
+            <a:schemeClr val="accent1">
+              <a:shade val="50000"/>
+            </a:schemeClr>
+          </a:lnRef>
+          <a:fillRef idx="1">
+            <a:schemeClr val="accent1"/>
+          </a:fillRef>
+          <a:effectRef idx="0">
+            <a:schemeClr val="accent1"/>
+          </a:effectRef>
+          <a:fontRef idx="minor">
+            <a:schemeClr val="lt1"/>
+          </a:fontRef>
+        </p:style>
+        <p:txBody>
+          <a:bodyPr rtlCol="0" anchor="ctr"/>
+          <a:lstStyle/>
+          <a:p>
+            <a:pPr algn="ctr"/>
+            <a:r>
+              <a:rPr lang="en-US" dirty="0"/>
+              <a:t>Euler</a:t>
+            </a:r>
+          </a:p>
+        </p:txBody>
+      </p:sp>
+      <p:sp>
+        <p:nvSpPr>
+          <p:cNvPr id="57" name="Rectangle 56">
+            <a:extLst>
+              <a:ext uri="{FF2B5EF4-FFF2-40B4-BE49-F238E27FC236}">
+                <a16:creationId xmlns:a16="http://schemas.microsoft.com/office/drawing/2014/main" id="{AF6EC2CB-ED10-5693-1A84-08C2DB467412}"/>
+              </a:ext>
+            </a:extLst>
+          </p:cNvPr>
+          <p:cNvSpPr/>
+          <p:nvPr/>
+        </p:nvSpPr>
+        <p:spPr>
+          <a:xfrm>
+            <a:off x="6426309" y="5763130"/>
+            <a:ext cx="1305433" cy="589547"/>
+          </a:xfrm>
+          <a:prstGeom prst="rect">
+            <a:avLst/>
+          </a:prstGeom>
+          <a:solidFill>
+            <a:schemeClr val="accent4">
+              <a:lumMod val="50000"/>
+            </a:schemeClr>
+          </a:solidFill>
+        </p:spPr>
+        <p:style>
+          <a:lnRef idx="2">
+            <a:schemeClr val="accent1">
+              <a:shade val="50000"/>
+            </a:schemeClr>
+          </a:lnRef>
+          <a:fillRef idx="1">
+            <a:schemeClr val="accent1"/>
+          </a:fillRef>
+          <a:effectRef idx="0">
+            <a:schemeClr val="accent1"/>
+          </a:effectRef>
+          <a:fontRef idx="minor">
+            <a:schemeClr val="lt1"/>
+          </a:fontRef>
+        </p:style>
+        <p:txBody>
+          <a:bodyPr rtlCol="0" anchor="ctr"/>
+          <a:lstStyle/>
+          <a:p>
+            <a:pPr algn="ctr"/>
+            <a:r>
+              <a:rPr lang="en-US" dirty="0" err="1"/>
+              <a:t>RungeKutta</a:t>
+            </a:r>
+            <a:endParaRPr lang="en-US" dirty="0"/>
+          </a:p>
+        </p:txBody>
+      </p:sp>
+      <p:sp>
+        <p:nvSpPr>
+          <p:cNvPr id="58" name="Rectangle 57">
+            <a:extLst>
+              <a:ext uri="{FF2B5EF4-FFF2-40B4-BE49-F238E27FC236}">
+                <a16:creationId xmlns:a16="http://schemas.microsoft.com/office/drawing/2014/main" id="{0581AD61-CD06-8D44-79F4-74737E145455}"/>
+              </a:ext>
+            </a:extLst>
+          </p:cNvPr>
+          <p:cNvSpPr/>
+          <p:nvPr/>
+        </p:nvSpPr>
+        <p:spPr>
+          <a:xfrm>
+            <a:off x="7875670" y="5759116"/>
+            <a:ext cx="1145012" cy="589547"/>
+          </a:xfrm>
+          <a:prstGeom prst="rect">
+            <a:avLst/>
+          </a:prstGeom>
+          <a:solidFill>
+            <a:schemeClr val="accent4">
+              <a:lumMod val="50000"/>
+            </a:schemeClr>
+          </a:solidFill>
+        </p:spPr>
+        <p:style>
+          <a:lnRef idx="2">
+            <a:schemeClr val="accent1">
+              <a:shade val="50000"/>
+            </a:schemeClr>
+          </a:lnRef>
+          <a:fillRef idx="1">
+            <a:schemeClr val="accent1"/>
+          </a:fillRef>
+          <a:effectRef idx="0">
+            <a:schemeClr val="accent1"/>
+          </a:effectRef>
+          <a:fontRef idx="minor">
+            <a:schemeClr val="lt1"/>
+          </a:fontRef>
+        </p:style>
+        <p:txBody>
+          <a:bodyPr rtlCol="0" anchor="ctr"/>
+          <a:lstStyle/>
+          <a:p>
+            <a:pPr algn="ctr"/>
+            <a:r>
+              <a:rPr lang="en-US" dirty="0"/>
+              <a:t>Midpoint</a:t>
+            </a:r>
+          </a:p>
+        </p:txBody>
+      </p:sp>
+      <p:sp>
+        <p:nvSpPr>
+          <p:cNvPr id="59" name="Rectangle 58">
+            <a:extLst>
+              <a:ext uri="{FF2B5EF4-FFF2-40B4-BE49-F238E27FC236}">
+                <a16:creationId xmlns:a16="http://schemas.microsoft.com/office/drawing/2014/main" id="{85D14984-D08F-BC6E-03EE-4A8AA5B98F03}"/>
+              </a:ext>
+            </a:extLst>
+          </p:cNvPr>
+          <p:cNvSpPr/>
+          <p:nvPr/>
+        </p:nvSpPr>
+        <p:spPr>
+          <a:xfrm>
+            <a:off x="10785304" y="3848098"/>
+            <a:ext cx="1145012" cy="589547"/>
+          </a:xfrm>
+          <a:prstGeom prst="rect">
+            <a:avLst/>
+          </a:prstGeom>
+          <a:solidFill>
+            <a:schemeClr val="accent4">
+              <a:lumMod val="50000"/>
+            </a:schemeClr>
+          </a:solidFill>
+        </p:spPr>
+        <p:style>
+          <a:lnRef idx="2">
+            <a:schemeClr val="accent1">
+              <a:shade val="50000"/>
+            </a:schemeClr>
+          </a:lnRef>
+          <a:fillRef idx="1">
+            <a:schemeClr val="accent1"/>
+          </a:fillRef>
+          <a:effectRef idx="0">
+            <a:schemeClr val="accent1"/>
+          </a:effectRef>
+          <a:fontRef idx="minor">
+            <a:schemeClr val="lt1"/>
+          </a:fontRef>
+        </p:style>
+        <p:txBody>
+          <a:bodyPr rtlCol="0" anchor="ctr"/>
+          <a:lstStyle/>
+          <a:p>
+            <a:pPr algn="ctr"/>
+            <a:r>
+              <a:rPr lang="en-US" dirty="0" err="1"/>
+              <a:t>Latttice</a:t>
+            </a:r>
+            <a:endParaRPr lang="en-US" dirty="0"/>
+          </a:p>
+        </p:txBody>
+      </p:sp>
+      <p:sp>
+        <p:nvSpPr>
+          <p:cNvPr id="60" name="Rectangle 59">
+            <a:extLst>
+              <a:ext uri="{FF2B5EF4-FFF2-40B4-BE49-F238E27FC236}">
+                <a16:creationId xmlns:a16="http://schemas.microsoft.com/office/drawing/2014/main" id="{1A90959F-55B8-0804-86AC-E04F9DAF02BE}"/>
+              </a:ext>
+            </a:extLst>
+          </p:cNvPr>
+          <p:cNvSpPr/>
+          <p:nvPr/>
+        </p:nvSpPr>
+        <p:spPr>
+          <a:xfrm>
+            <a:off x="9190123" y="3848098"/>
+            <a:ext cx="1483894" cy="589547"/>
+          </a:xfrm>
+          <a:prstGeom prst="rect">
+            <a:avLst/>
+          </a:prstGeom>
+          <a:solidFill>
+            <a:schemeClr val="accent4">
+              <a:lumMod val="50000"/>
+            </a:schemeClr>
+          </a:solidFill>
+        </p:spPr>
+        <p:style>
+          <a:lnRef idx="2">
+            <a:schemeClr val="accent1">
+              <a:shade val="50000"/>
+            </a:schemeClr>
+          </a:lnRef>
+          <a:fillRef idx="1">
+            <a:schemeClr val="accent1"/>
+          </a:fillRef>
+          <a:effectRef idx="0">
+            <a:schemeClr val="accent1"/>
+          </a:effectRef>
+          <a:fontRef idx="minor">
+            <a:schemeClr val="lt1"/>
+          </a:fontRef>
+        </p:style>
+        <p:txBody>
+          <a:bodyPr rtlCol="0" anchor="ctr"/>
+          <a:lstStyle/>
+          <a:p>
+            <a:pPr algn="ctr"/>
+            <a:r>
+              <a:rPr lang="en-US" dirty="0" err="1"/>
+              <a:t>WithDensity</a:t>
+            </a:r>
+            <a:endParaRPr lang="en-US" dirty="0"/>
+          </a:p>
+        </p:txBody>
+      </p:sp>
+      <p:sp>
+        <p:nvSpPr>
+          <p:cNvPr id="61" name="Rectangle 60">
+            <a:extLst>
+              <a:ext uri="{FF2B5EF4-FFF2-40B4-BE49-F238E27FC236}">
+                <a16:creationId xmlns:a16="http://schemas.microsoft.com/office/drawing/2014/main" id="{AC71B326-3592-4E2D-89A1-29AB5AF83388}"/>
+              </a:ext>
+            </a:extLst>
+          </p:cNvPr>
+          <p:cNvSpPr/>
+          <p:nvPr/>
+        </p:nvSpPr>
+        <p:spPr>
+          <a:xfrm>
+            <a:off x="7859627" y="3838070"/>
+            <a:ext cx="1145012" cy="589547"/>
+          </a:xfrm>
+          <a:prstGeom prst="rect">
+            <a:avLst/>
+          </a:prstGeom>
+          <a:solidFill>
+            <a:schemeClr val="accent4">
+              <a:lumMod val="50000"/>
+            </a:schemeClr>
+          </a:solidFill>
+        </p:spPr>
+        <p:style>
+          <a:lnRef idx="2">
+            <a:schemeClr val="accent1">
+              <a:shade val="50000"/>
+            </a:schemeClr>
+          </a:lnRef>
+          <a:fillRef idx="1">
+            <a:schemeClr val="accent1"/>
+          </a:fillRef>
+          <a:effectRef idx="0">
+            <a:schemeClr val="accent1"/>
+          </a:effectRef>
+          <a:fontRef idx="minor">
+            <a:schemeClr val="lt1"/>
+          </a:fontRef>
+        </p:style>
+        <p:txBody>
+          <a:bodyPr rtlCol="0" anchor="ctr"/>
+          <a:lstStyle/>
+          <a:p>
+            <a:pPr algn="ctr"/>
+            <a:r>
+              <a:rPr lang="en-US" dirty="0"/>
+              <a:t>Lattice</a:t>
+            </a:r>
+          </a:p>
+        </p:txBody>
+      </p:sp>
+      <p:sp>
+        <p:nvSpPr>
+          <p:cNvPr id="64" name="Rectangle 63">
+            <a:extLst>
+              <a:ext uri="{FF2B5EF4-FFF2-40B4-BE49-F238E27FC236}">
+                <a16:creationId xmlns:a16="http://schemas.microsoft.com/office/drawing/2014/main" id="{04D156E0-F93C-6678-78EF-364A9FDB0BC1}"/>
+              </a:ext>
+            </a:extLst>
+          </p:cNvPr>
+          <p:cNvSpPr/>
+          <p:nvPr/>
+        </p:nvSpPr>
+        <p:spPr>
+          <a:xfrm>
+            <a:off x="3512200" y="5759115"/>
+            <a:ext cx="1305433" cy="589547"/>
+          </a:xfrm>
+          <a:prstGeom prst="rect">
+            <a:avLst/>
+          </a:prstGeom>
+          <a:solidFill>
+            <a:schemeClr val="accent4">
+              <a:lumMod val="50000"/>
+            </a:schemeClr>
+          </a:solidFill>
+        </p:spPr>
+        <p:style>
+          <a:lnRef idx="2">
+            <a:schemeClr val="accent1">
+              <a:shade val="50000"/>
+            </a:schemeClr>
+          </a:lnRef>
+          <a:fillRef idx="1">
+            <a:schemeClr val="accent1"/>
+          </a:fillRef>
+          <a:effectRef idx="0">
+            <a:schemeClr val="accent1"/>
+          </a:effectRef>
+          <a:fontRef idx="minor">
+            <a:schemeClr val="lt1"/>
+          </a:fontRef>
+        </p:style>
+        <p:txBody>
+          <a:bodyPr rtlCol="0" anchor="ctr"/>
+          <a:lstStyle/>
+          <a:p>
+            <a:pPr algn="ctr"/>
+            <a:r>
+              <a:rPr lang="en-US" dirty="0" err="1"/>
+              <a:t>RungeKutta</a:t>
+            </a:r>
+            <a:endParaRPr lang="en-US" dirty="0"/>
+          </a:p>
+        </p:txBody>
+      </p:sp>
+      <p:sp>
+        <p:nvSpPr>
+          <p:cNvPr id="65" name="Rectangle 64">
+            <a:extLst>
+              <a:ext uri="{FF2B5EF4-FFF2-40B4-BE49-F238E27FC236}">
+                <a16:creationId xmlns:a16="http://schemas.microsoft.com/office/drawing/2014/main" id="{32B873C0-C4A7-E9AA-F141-20F317F373FC}"/>
+              </a:ext>
+            </a:extLst>
+          </p:cNvPr>
+          <p:cNvSpPr/>
+          <p:nvPr/>
+        </p:nvSpPr>
+        <p:spPr>
+          <a:xfrm>
+            <a:off x="9682405" y="3117181"/>
+            <a:ext cx="1720518" cy="453191"/>
+          </a:xfrm>
+          <a:prstGeom prst="rect">
+            <a:avLst/>
+          </a:prstGeom>
+          <a:solidFill>
+            <a:schemeClr val="accent2">
+              <a:lumMod val="60000"/>
+              <a:lumOff val="40000"/>
+            </a:schemeClr>
+          </a:solidFill>
+        </p:spPr>
+        <p:style>
+          <a:lnRef idx="2">
+            <a:schemeClr val="accent1">
+              <a:shade val="50000"/>
+            </a:schemeClr>
+          </a:lnRef>
+          <a:fillRef idx="1">
+            <a:schemeClr val="accent1"/>
+          </a:fillRef>
+          <a:effectRef idx="0">
+            <a:schemeClr val="accent1"/>
+          </a:effectRef>
+          <a:fontRef idx="minor">
+            <a:schemeClr val="lt1"/>
+          </a:fontRef>
+        </p:style>
+        <p:txBody>
+          <a:bodyPr rtlCol="0" anchor="ctr"/>
+          <a:lstStyle/>
+          <a:p>
+            <a:pPr algn="ctr"/>
+            <a:r>
+              <a:rPr lang="en-US" dirty="0" err="1">
+                <a:solidFill>
+                  <a:schemeClr val="tx1"/>
+                </a:solidFill>
+              </a:rPr>
+              <a:t>ParticlesOwned</a:t>
+            </a:r>
+            <a:endParaRPr lang="en-US" dirty="0">
+              <a:solidFill>
+                <a:schemeClr val="tx1"/>
+              </a:solidFill>
+            </a:endParaRPr>
+          </a:p>
+        </p:txBody>
+      </p:sp>
+      <p:sp>
+        <p:nvSpPr>
+          <p:cNvPr id="66" name="Rectangle 65">
+            <a:extLst>
+              <a:ext uri="{FF2B5EF4-FFF2-40B4-BE49-F238E27FC236}">
+                <a16:creationId xmlns:a16="http://schemas.microsoft.com/office/drawing/2014/main" id="{78B12DCC-A072-23D5-D1F5-BFA632985098}"/>
+              </a:ext>
+            </a:extLst>
+          </p:cNvPr>
+          <p:cNvSpPr/>
+          <p:nvPr/>
+        </p:nvSpPr>
+        <p:spPr>
+          <a:xfrm>
+            <a:off x="7679137" y="3108155"/>
+            <a:ext cx="1483895" cy="453191"/>
+          </a:xfrm>
+          <a:prstGeom prst="rect">
+            <a:avLst/>
+          </a:prstGeom>
+          <a:solidFill>
+            <a:schemeClr val="accent2">
+              <a:lumMod val="60000"/>
+              <a:lumOff val="40000"/>
+            </a:schemeClr>
+          </a:solidFill>
+        </p:spPr>
+        <p:style>
+          <a:lnRef idx="2">
+            <a:schemeClr val="accent1">
+              <a:shade val="50000"/>
+            </a:schemeClr>
+          </a:lnRef>
+          <a:fillRef idx="1">
+            <a:schemeClr val="accent1"/>
+          </a:fillRef>
+          <a:effectRef idx="0">
+            <a:schemeClr val="accent1"/>
+          </a:effectRef>
+          <a:fontRef idx="minor">
+            <a:schemeClr val="lt1"/>
+          </a:fontRef>
+        </p:style>
+        <p:txBody>
+          <a:bodyPr rtlCol="0" anchor="ctr"/>
+          <a:lstStyle/>
+          <a:p>
+            <a:pPr algn="ctr"/>
+            <a:r>
+              <a:rPr lang="en-US" dirty="0" err="1">
+                <a:solidFill>
+                  <a:schemeClr val="tx1"/>
+                </a:solidFill>
+              </a:rPr>
+              <a:t>MeshOwned</a:t>
+            </a:r>
+            <a:endParaRPr lang="en-US" dirty="0">
+              <a:solidFill>
+                <a:schemeClr val="tx1"/>
+              </a:solidFill>
+            </a:endParaRPr>
+          </a:p>
+        </p:txBody>
+      </p:sp>
+      <p:sp>
+        <p:nvSpPr>
+          <p:cNvPr id="67" name="Rectangle 66">
+            <a:extLst>
+              <a:ext uri="{FF2B5EF4-FFF2-40B4-BE49-F238E27FC236}">
+                <a16:creationId xmlns:a16="http://schemas.microsoft.com/office/drawing/2014/main" id="{94E54286-5078-A4FA-6CC9-F7B1CBCCB1DA}"/>
+              </a:ext>
+            </a:extLst>
+          </p:cNvPr>
+          <p:cNvSpPr/>
+          <p:nvPr/>
+        </p:nvSpPr>
+        <p:spPr>
+          <a:xfrm>
+            <a:off x="6223330" y="4800600"/>
+            <a:ext cx="1720518" cy="453191"/>
+          </a:xfrm>
+          <a:prstGeom prst="rect">
+            <a:avLst/>
+          </a:prstGeom>
+          <a:solidFill>
+            <a:schemeClr val="accent2">
+              <a:lumMod val="60000"/>
+              <a:lumOff val="40000"/>
+            </a:schemeClr>
+          </a:solidFill>
+        </p:spPr>
+        <p:style>
+          <a:lnRef idx="2">
+            <a:schemeClr val="accent1">
+              <a:shade val="50000"/>
+            </a:schemeClr>
+          </a:lnRef>
+          <a:fillRef idx="1">
+            <a:schemeClr val="accent1"/>
+          </a:fillRef>
+          <a:effectRef idx="0">
+            <a:schemeClr val="accent1"/>
+          </a:effectRef>
+          <a:fontRef idx="minor">
+            <a:schemeClr val="lt1"/>
+          </a:fontRef>
+        </p:style>
+        <p:txBody>
+          <a:bodyPr rtlCol="0" anchor="ctr"/>
+          <a:lstStyle/>
+          <a:p>
+            <a:pPr algn="ctr"/>
+            <a:r>
+              <a:rPr lang="en-US" dirty="0" err="1">
+                <a:solidFill>
+                  <a:schemeClr val="tx1"/>
+                </a:solidFill>
+              </a:rPr>
+              <a:t>ParticlesOwned</a:t>
+            </a:r>
+            <a:endParaRPr lang="en-US" dirty="0">
+              <a:solidFill>
+                <a:schemeClr val="tx1"/>
+              </a:solidFill>
+            </a:endParaRPr>
+          </a:p>
+        </p:txBody>
+      </p:sp>
+      <p:sp>
+        <p:nvSpPr>
+          <p:cNvPr id="68" name="Rectangle 67">
+            <a:extLst>
+              <a:ext uri="{FF2B5EF4-FFF2-40B4-BE49-F238E27FC236}">
+                <a16:creationId xmlns:a16="http://schemas.microsoft.com/office/drawing/2014/main" id="{126123DD-D531-8874-B8B1-D06559390CF4}"/>
+              </a:ext>
+            </a:extLst>
+          </p:cNvPr>
+          <p:cNvSpPr/>
+          <p:nvPr/>
+        </p:nvSpPr>
+        <p:spPr>
+          <a:xfrm>
+            <a:off x="3421963" y="4800600"/>
+            <a:ext cx="1483895" cy="453191"/>
+          </a:xfrm>
+          <a:prstGeom prst="rect">
+            <a:avLst/>
+          </a:prstGeom>
+          <a:solidFill>
+            <a:schemeClr val="accent2">
+              <a:lumMod val="60000"/>
+              <a:lumOff val="40000"/>
+            </a:schemeClr>
+          </a:solidFill>
+        </p:spPr>
+        <p:style>
+          <a:lnRef idx="2">
+            <a:schemeClr val="accent1">
+              <a:shade val="50000"/>
+            </a:schemeClr>
+          </a:lnRef>
+          <a:fillRef idx="1">
+            <a:schemeClr val="accent1"/>
+          </a:fillRef>
+          <a:effectRef idx="0">
+            <a:schemeClr val="accent1"/>
+          </a:effectRef>
+          <a:fontRef idx="minor">
+            <a:schemeClr val="lt1"/>
+          </a:fontRef>
+        </p:style>
+        <p:txBody>
+          <a:bodyPr rtlCol="0" anchor="ctr"/>
+          <a:lstStyle/>
+          <a:p>
+            <a:pPr algn="ctr"/>
+            <a:r>
+              <a:rPr lang="en-US" dirty="0" err="1">
+                <a:solidFill>
+                  <a:schemeClr val="tx1"/>
+                </a:solidFill>
+              </a:rPr>
+              <a:t>MeshOwned</a:t>
+            </a:r>
+            <a:endParaRPr lang="en-US" dirty="0">
+              <a:solidFill>
+                <a:schemeClr val="tx1"/>
+              </a:solidFill>
+            </a:endParaRPr>
+          </a:p>
+        </p:txBody>
+      </p:sp>
+      <p:cxnSp>
+        <p:nvCxnSpPr>
+          <p:cNvPr id="16" name="Straight Arrow Connector 15">
+            <a:extLst>
+              <a:ext uri="{FF2B5EF4-FFF2-40B4-BE49-F238E27FC236}">
+                <a16:creationId xmlns:a16="http://schemas.microsoft.com/office/drawing/2014/main" id="{B8D4E2D1-794C-71D8-4BCE-6D788772E409}"/>
+              </a:ext>
+            </a:extLst>
+          </p:cNvPr>
+          <p:cNvCxnSpPr>
+            <a:stCxn id="39942" idx="2"/>
+            <a:endCxn id="51" idx="0"/>
+          </p:cNvCxnSpPr>
+          <p:nvPr/>
+        </p:nvCxnSpPr>
+        <p:spPr>
+          <a:xfrm>
+            <a:off x="5638792" y="2667000"/>
+            <a:ext cx="4016" cy="725906"/>
+          </a:xfrm>
+          <a:prstGeom prst="straightConnector1">
+            <a:avLst/>
+          </a:prstGeom>
+          <a:ln w="31750">
+            <a:solidFill>
+              <a:schemeClr val="tx1"/>
+            </a:solidFill>
+            <a:tailEnd type="triangle"/>
+          </a:ln>
+        </p:spPr>
+        <p:style>
+          <a:lnRef idx="1">
+            <a:schemeClr val="accent1"/>
+          </a:lnRef>
+          <a:fillRef idx="0">
+            <a:schemeClr val="accent1"/>
+          </a:fillRef>
+          <a:effectRef idx="0">
+            <a:schemeClr val="accent1"/>
+          </a:effectRef>
+          <a:fontRef idx="minor">
+            <a:schemeClr val="tx1"/>
+          </a:fontRef>
+        </p:style>
+      </p:cxnSp>
+      <p:cxnSp>
+        <p:nvCxnSpPr>
+          <p:cNvPr id="18" name="Elbow Connector 17">
+            <a:extLst>
+              <a:ext uri="{FF2B5EF4-FFF2-40B4-BE49-F238E27FC236}">
+                <a16:creationId xmlns:a16="http://schemas.microsoft.com/office/drawing/2014/main" id="{82D0270F-851B-649F-B3BD-9DD7E81BBAAD}"/>
+              </a:ext>
+            </a:extLst>
+          </p:cNvPr>
+          <p:cNvCxnSpPr>
+            <a:stCxn id="39943" idx="2"/>
+            <a:endCxn id="52" idx="0"/>
+          </p:cNvCxnSpPr>
+          <p:nvPr/>
+        </p:nvCxnSpPr>
+        <p:spPr>
+          <a:xfrm rot="16200000" flipH="1">
+            <a:off x="2473488" y="2369220"/>
+            <a:ext cx="441155" cy="1036714"/>
+          </a:xfrm>
+          <a:prstGeom prst="bentConnector3">
+            <a:avLst/>
+          </a:prstGeom>
+          <a:ln w="31750">
+            <a:solidFill>
+              <a:schemeClr val="tx1"/>
+            </a:solidFill>
+            <a:tailEnd type="triangle"/>
+          </a:ln>
+        </p:spPr>
+        <p:style>
+          <a:lnRef idx="1">
+            <a:schemeClr val="accent1"/>
+          </a:lnRef>
+          <a:fillRef idx="0">
+            <a:schemeClr val="accent1"/>
+          </a:fillRef>
+          <a:effectRef idx="0">
+            <a:schemeClr val="accent1"/>
+          </a:effectRef>
+          <a:fontRef idx="minor">
+            <a:schemeClr val="tx1"/>
+          </a:fontRef>
+        </p:style>
+      </p:cxnSp>
+      <p:cxnSp>
+        <p:nvCxnSpPr>
+          <p:cNvPr id="20" name="Elbow Connector 19">
+            <a:extLst>
+              <a:ext uri="{FF2B5EF4-FFF2-40B4-BE49-F238E27FC236}">
+                <a16:creationId xmlns:a16="http://schemas.microsoft.com/office/drawing/2014/main" id="{0CEB1B69-6E6E-1063-7EB7-3AC321EC3CB1}"/>
+              </a:ext>
+            </a:extLst>
+          </p:cNvPr>
+          <p:cNvCxnSpPr>
+            <a:stCxn id="39943" idx="2"/>
+            <a:endCxn id="53" idx="0"/>
+          </p:cNvCxnSpPr>
+          <p:nvPr/>
+        </p:nvCxnSpPr>
+        <p:spPr>
+          <a:xfrm rot="5400000">
+            <a:off x="1573122" y="2505568"/>
+            <a:ext cx="441155" cy="764018"/>
+          </a:xfrm>
+          <a:prstGeom prst="bentConnector3">
+            <a:avLst/>
+          </a:prstGeom>
+          <a:ln w="31750">
+            <a:solidFill>
+              <a:schemeClr val="tx1"/>
+            </a:solidFill>
+            <a:tailEnd type="triangle"/>
+          </a:ln>
+        </p:spPr>
+        <p:style>
+          <a:lnRef idx="1">
+            <a:schemeClr val="accent1"/>
+          </a:lnRef>
+          <a:fillRef idx="0">
+            <a:schemeClr val="accent1"/>
+          </a:fillRef>
+          <a:effectRef idx="0">
+            <a:schemeClr val="accent1"/>
+          </a:effectRef>
+          <a:fontRef idx="minor">
+            <a:schemeClr val="tx1"/>
+          </a:fontRef>
+        </p:style>
+      </p:cxnSp>
+      <p:cxnSp>
+        <p:nvCxnSpPr>
+          <p:cNvPr id="22" name="Elbow Connector 21">
+            <a:extLst>
+              <a:ext uri="{FF2B5EF4-FFF2-40B4-BE49-F238E27FC236}">
+                <a16:creationId xmlns:a16="http://schemas.microsoft.com/office/drawing/2014/main" id="{D3BB852F-E195-D641-E937-F39E10F9C6A9}"/>
+              </a:ext>
+            </a:extLst>
+          </p:cNvPr>
+          <p:cNvCxnSpPr>
+            <a:stCxn id="39941" idx="2"/>
+            <a:endCxn id="65" idx="0"/>
+          </p:cNvCxnSpPr>
+          <p:nvPr/>
+        </p:nvCxnSpPr>
+        <p:spPr>
+          <a:xfrm rot="16200000" flipH="1">
+            <a:off x="9889954" y="2464470"/>
+            <a:ext cx="373981" cy="931440"/>
+          </a:xfrm>
+          <a:prstGeom prst="bentConnector3">
+            <a:avLst/>
+          </a:prstGeom>
+          <a:ln w="31750">
+            <a:solidFill>
+              <a:schemeClr val="tx1"/>
+            </a:solidFill>
+            <a:tailEnd type="triangle"/>
+          </a:ln>
+        </p:spPr>
+        <p:style>
+          <a:lnRef idx="1">
+            <a:schemeClr val="accent1"/>
+          </a:lnRef>
+          <a:fillRef idx="0">
+            <a:schemeClr val="accent1"/>
+          </a:fillRef>
+          <a:effectRef idx="0">
+            <a:schemeClr val="accent1"/>
+          </a:effectRef>
+          <a:fontRef idx="minor">
+            <a:schemeClr val="tx1"/>
+          </a:fontRef>
+        </p:style>
+      </p:cxnSp>
+      <p:cxnSp>
+        <p:nvCxnSpPr>
+          <p:cNvPr id="24" name="Elbow Connector 23">
+            <a:extLst>
+              <a:ext uri="{FF2B5EF4-FFF2-40B4-BE49-F238E27FC236}">
+                <a16:creationId xmlns:a16="http://schemas.microsoft.com/office/drawing/2014/main" id="{B3702AFD-08C5-92EB-04F7-E1A1DB029537}"/>
+              </a:ext>
+            </a:extLst>
+          </p:cNvPr>
+          <p:cNvCxnSpPr>
+            <a:stCxn id="39941" idx="2"/>
+            <a:endCxn id="66" idx="0"/>
+          </p:cNvCxnSpPr>
+          <p:nvPr/>
+        </p:nvCxnSpPr>
+        <p:spPr>
+          <a:xfrm rot="5400000">
+            <a:off x="8833678" y="2330608"/>
+            <a:ext cx="364955" cy="1190139"/>
+          </a:xfrm>
+          <a:prstGeom prst="bentConnector3">
+            <a:avLst/>
+          </a:prstGeom>
+          <a:ln w="31750">
+            <a:solidFill>
+              <a:schemeClr val="tx1"/>
+            </a:solidFill>
+            <a:tailEnd type="triangle"/>
+          </a:ln>
+        </p:spPr>
+        <p:style>
+          <a:lnRef idx="1">
+            <a:schemeClr val="accent1"/>
+          </a:lnRef>
+          <a:fillRef idx="0">
+            <a:schemeClr val="accent1"/>
+          </a:fillRef>
+          <a:effectRef idx="0">
+            <a:schemeClr val="accent1"/>
+          </a:effectRef>
+          <a:fontRef idx="minor">
+            <a:schemeClr val="tx1"/>
+          </a:fontRef>
+        </p:style>
+      </p:cxnSp>
+      <p:cxnSp>
+        <p:nvCxnSpPr>
+          <p:cNvPr id="26" name="Elbow Connector 25">
+            <a:extLst>
+              <a:ext uri="{FF2B5EF4-FFF2-40B4-BE49-F238E27FC236}">
+                <a16:creationId xmlns:a16="http://schemas.microsoft.com/office/drawing/2014/main" id="{A726B4F1-B762-7070-6D0B-D6DFEA50D0C9}"/>
+              </a:ext>
+            </a:extLst>
+          </p:cNvPr>
+          <p:cNvCxnSpPr>
+            <a:stCxn id="65" idx="2"/>
+            <a:endCxn id="59" idx="0"/>
+          </p:cNvCxnSpPr>
+          <p:nvPr/>
+        </p:nvCxnSpPr>
+        <p:spPr>
+          <a:xfrm rot="16200000" flipH="1">
+            <a:off x="10811374" y="3301662"/>
+            <a:ext cx="277726" cy="815146"/>
+          </a:xfrm>
+          <a:prstGeom prst="bentConnector3">
+            <a:avLst/>
+          </a:prstGeom>
+          <a:ln w="31750">
+            <a:solidFill>
+              <a:schemeClr val="tx1"/>
+            </a:solidFill>
+            <a:tailEnd type="triangle"/>
+          </a:ln>
+        </p:spPr>
+        <p:style>
+          <a:lnRef idx="1">
+            <a:schemeClr val="accent1"/>
+          </a:lnRef>
+          <a:fillRef idx="0">
+            <a:schemeClr val="accent1"/>
+          </a:fillRef>
+          <a:effectRef idx="0">
+            <a:schemeClr val="accent1"/>
+          </a:effectRef>
+          <a:fontRef idx="minor">
+            <a:schemeClr val="tx1"/>
+          </a:fontRef>
+        </p:style>
+      </p:cxnSp>
+      <p:cxnSp>
+        <p:nvCxnSpPr>
+          <p:cNvPr id="28" name="Elbow Connector 27">
+            <a:extLst>
+              <a:ext uri="{FF2B5EF4-FFF2-40B4-BE49-F238E27FC236}">
+                <a16:creationId xmlns:a16="http://schemas.microsoft.com/office/drawing/2014/main" id="{A6A9CA0F-A35A-417C-FE85-C9FB244A591F}"/>
+              </a:ext>
+            </a:extLst>
+          </p:cNvPr>
+          <p:cNvCxnSpPr>
+            <a:stCxn id="65" idx="2"/>
+            <a:endCxn id="60" idx="0"/>
+          </p:cNvCxnSpPr>
+          <p:nvPr/>
+        </p:nvCxnSpPr>
+        <p:spPr>
+          <a:xfrm rot="5400000">
+            <a:off x="10098504" y="3403938"/>
+            <a:ext cx="277726" cy="610594"/>
+          </a:xfrm>
+          <a:prstGeom prst="bentConnector3">
+            <a:avLst/>
+          </a:prstGeom>
+          <a:ln w="31750">
+            <a:solidFill>
+              <a:schemeClr val="tx1"/>
+            </a:solidFill>
+            <a:tailEnd type="triangle"/>
+          </a:ln>
+        </p:spPr>
+        <p:style>
+          <a:lnRef idx="1">
+            <a:schemeClr val="accent1"/>
+          </a:lnRef>
+          <a:fillRef idx="0">
+            <a:schemeClr val="accent1"/>
+          </a:fillRef>
+          <a:effectRef idx="0">
+            <a:schemeClr val="accent1"/>
+          </a:effectRef>
+          <a:fontRef idx="minor">
+            <a:schemeClr val="tx1"/>
+          </a:fontRef>
+        </p:style>
+      </p:cxnSp>
+      <p:cxnSp>
+        <p:nvCxnSpPr>
+          <p:cNvPr id="32" name="Elbow Connector 31">
+            <a:extLst>
+              <a:ext uri="{FF2B5EF4-FFF2-40B4-BE49-F238E27FC236}">
+                <a16:creationId xmlns:a16="http://schemas.microsoft.com/office/drawing/2014/main" id="{A43E58B3-1196-CE63-B37A-3AA5BF08B229}"/>
+              </a:ext>
+            </a:extLst>
+          </p:cNvPr>
+          <p:cNvCxnSpPr>
+            <a:stCxn id="51" idx="4"/>
+            <a:endCxn id="67" idx="0"/>
+          </p:cNvCxnSpPr>
+          <p:nvPr/>
+        </p:nvCxnSpPr>
+        <p:spPr>
+          <a:xfrm rot="16200000" flipH="1">
+            <a:off x="6002251" y="3719262"/>
+            <a:ext cx="721894" cy="1440781"/>
+          </a:xfrm>
+          <a:prstGeom prst="bentConnector3">
+            <a:avLst/>
+          </a:prstGeom>
+          <a:ln w="31750">
+            <a:solidFill>
+              <a:schemeClr val="tx1"/>
+            </a:solidFill>
+            <a:tailEnd type="triangle"/>
+          </a:ln>
+        </p:spPr>
+        <p:style>
+          <a:lnRef idx="1">
+            <a:schemeClr val="accent1"/>
+          </a:lnRef>
+          <a:fillRef idx="0">
+            <a:schemeClr val="accent1"/>
+          </a:fillRef>
+          <a:effectRef idx="0">
+            <a:schemeClr val="accent1"/>
+          </a:effectRef>
+          <a:fontRef idx="minor">
+            <a:schemeClr val="tx1"/>
+          </a:fontRef>
+        </p:style>
+      </p:cxnSp>
+      <p:cxnSp>
+        <p:nvCxnSpPr>
+          <p:cNvPr id="34" name="Elbow Connector 33">
+            <a:extLst>
+              <a:ext uri="{FF2B5EF4-FFF2-40B4-BE49-F238E27FC236}">
+                <a16:creationId xmlns:a16="http://schemas.microsoft.com/office/drawing/2014/main" id="{79C51A9C-20F6-25A9-3E85-CEABA77854AD}"/>
+              </a:ext>
+            </a:extLst>
+          </p:cNvPr>
+          <p:cNvCxnSpPr>
+            <a:stCxn id="51" idx="4"/>
+            <a:endCxn id="68" idx="0"/>
+          </p:cNvCxnSpPr>
+          <p:nvPr/>
+        </p:nvCxnSpPr>
+        <p:spPr>
+          <a:xfrm rot="5400000">
+            <a:off x="4542413" y="3700205"/>
+            <a:ext cx="721894" cy="1478897"/>
+          </a:xfrm>
+          <a:prstGeom prst="bentConnector3">
+            <a:avLst/>
+          </a:prstGeom>
+          <a:ln w="31750">
+            <a:solidFill>
+              <a:schemeClr val="tx1"/>
+            </a:solidFill>
+            <a:tailEnd type="triangle"/>
+          </a:ln>
+        </p:spPr>
+        <p:style>
+          <a:lnRef idx="1">
+            <a:schemeClr val="accent1"/>
+          </a:lnRef>
+          <a:fillRef idx="0">
+            <a:schemeClr val="accent1"/>
+          </a:fillRef>
+          <a:effectRef idx="0">
+            <a:schemeClr val="accent1"/>
+          </a:effectRef>
+          <a:fontRef idx="minor">
+            <a:schemeClr val="tx1"/>
+          </a:fontRef>
+        </p:style>
+      </p:cxnSp>
+      <p:cxnSp>
+        <p:nvCxnSpPr>
+          <p:cNvPr id="36" name="Elbow Connector 35">
+            <a:extLst>
+              <a:ext uri="{FF2B5EF4-FFF2-40B4-BE49-F238E27FC236}">
+                <a16:creationId xmlns:a16="http://schemas.microsoft.com/office/drawing/2014/main" id="{7748C8CF-D0DB-ADBD-4405-3309140F55E0}"/>
+              </a:ext>
+            </a:extLst>
+          </p:cNvPr>
+          <p:cNvCxnSpPr>
+            <a:stCxn id="67" idx="2"/>
+            <a:endCxn id="58" idx="0"/>
+          </p:cNvCxnSpPr>
+          <p:nvPr/>
+        </p:nvCxnSpPr>
+        <p:spPr>
+          <a:xfrm rot="16200000" flipH="1">
+            <a:off x="7513220" y="4824159"/>
+            <a:ext cx="505325" cy="1364587"/>
+          </a:xfrm>
+          <a:prstGeom prst="bentConnector3">
+            <a:avLst/>
+          </a:prstGeom>
+          <a:ln w="31750">
+            <a:solidFill>
+              <a:schemeClr val="tx1"/>
+            </a:solidFill>
+            <a:tailEnd type="triangle"/>
+          </a:ln>
+        </p:spPr>
+        <p:style>
+          <a:lnRef idx="1">
+            <a:schemeClr val="accent1"/>
+          </a:lnRef>
+          <a:fillRef idx="0">
+            <a:schemeClr val="accent1"/>
+          </a:fillRef>
+          <a:effectRef idx="0">
+            <a:schemeClr val="accent1"/>
+          </a:effectRef>
+          <a:fontRef idx="minor">
+            <a:schemeClr val="tx1"/>
+          </a:fontRef>
+        </p:style>
+      </p:cxnSp>
+      <p:cxnSp>
+        <p:nvCxnSpPr>
+          <p:cNvPr id="38" name="Straight Arrow Connector 37">
+            <a:extLst>
+              <a:ext uri="{FF2B5EF4-FFF2-40B4-BE49-F238E27FC236}">
+                <a16:creationId xmlns:a16="http://schemas.microsoft.com/office/drawing/2014/main" id="{9BD7297B-B557-4F5A-3988-69B591002218}"/>
+              </a:ext>
+            </a:extLst>
+          </p:cNvPr>
+          <p:cNvCxnSpPr>
+            <a:stCxn id="67" idx="2"/>
+            <a:endCxn id="57" idx="0"/>
+          </p:cNvCxnSpPr>
+          <p:nvPr/>
+        </p:nvCxnSpPr>
+        <p:spPr>
+          <a:xfrm flipH="1">
+            <a:off x="7079026" y="5253791"/>
+            <a:ext cx="4563" cy="509339"/>
+          </a:xfrm>
+          <a:prstGeom prst="straightConnector1">
+            <a:avLst/>
+          </a:prstGeom>
+          <a:ln w="31750">
+            <a:solidFill>
+              <a:schemeClr val="tx1"/>
+            </a:solidFill>
+            <a:tailEnd type="triangle"/>
+          </a:ln>
+        </p:spPr>
+        <p:style>
+          <a:lnRef idx="1">
+            <a:schemeClr val="accent1"/>
+          </a:lnRef>
+          <a:fillRef idx="0">
+            <a:schemeClr val="accent1"/>
+          </a:fillRef>
+          <a:effectRef idx="0">
+            <a:schemeClr val="accent1"/>
+          </a:effectRef>
+          <a:fontRef idx="minor">
+            <a:schemeClr val="tx1"/>
+          </a:fontRef>
+        </p:style>
+      </p:cxnSp>
+      <p:cxnSp>
+        <p:nvCxnSpPr>
+          <p:cNvPr id="40" name="Elbow Connector 39">
+            <a:extLst>
+              <a:ext uri="{FF2B5EF4-FFF2-40B4-BE49-F238E27FC236}">
+                <a16:creationId xmlns:a16="http://schemas.microsoft.com/office/drawing/2014/main" id="{76F1A9C0-5137-E411-0CC7-FAAF8788FABD}"/>
+              </a:ext>
+            </a:extLst>
+          </p:cNvPr>
+          <p:cNvCxnSpPr>
+            <a:stCxn id="67" idx="2"/>
+            <a:endCxn id="14" idx="0"/>
+          </p:cNvCxnSpPr>
+          <p:nvPr/>
+        </p:nvCxnSpPr>
+        <p:spPr>
+          <a:xfrm rot="5400000">
+            <a:off x="6112538" y="4792078"/>
+            <a:ext cx="509339" cy="1432765"/>
+          </a:xfrm>
+          <a:prstGeom prst="bentConnector3">
+            <a:avLst/>
+          </a:prstGeom>
+          <a:ln w="31750">
+            <a:solidFill>
+              <a:schemeClr val="tx1"/>
+            </a:solidFill>
+            <a:tailEnd type="triangle"/>
+          </a:ln>
+        </p:spPr>
+        <p:style>
+          <a:lnRef idx="1">
+            <a:schemeClr val="accent1"/>
+          </a:lnRef>
+          <a:fillRef idx="0">
+            <a:schemeClr val="accent1"/>
+          </a:fillRef>
+          <a:effectRef idx="0">
+            <a:schemeClr val="accent1"/>
+          </a:effectRef>
+          <a:fontRef idx="minor">
+            <a:schemeClr val="tx1"/>
+          </a:fontRef>
+        </p:style>
+      </p:cxnSp>
+      <p:cxnSp>
+        <p:nvCxnSpPr>
+          <p:cNvPr id="42" name="Straight Arrow Connector 41">
+            <a:extLst>
+              <a:ext uri="{FF2B5EF4-FFF2-40B4-BE49-F238E27FC236}">
+                <a16:creationId xmlns:a16="http://schemas.microsoft.com/office/drawing/2014/main" id="{83318961-C682-F929-669E-01B21EA24D24}"/>
+              </a:ext>
+            </a:extLst>
+          </p:cNvPr>
+          <p:cNvCxnSpPr>
+            <a:stCxn id="7" idx="4"/>
+            <a:endCxn id="39940" idx="0"/>
+          </p:cNvCxnSpPr>
+          <p:nvPr/>
+        </p:nvCxnSpPr>
+        <p:spPr>
+          <a:xfrm flipH="1">
+            <a:off x="5638800" y="759994"/>
+            <a:ext cx="6019" cy="230606"/>
+          </a:xfrm>
+          <a:prstGeom prst="straightConnector1">
+            <a:avLst/>
+          </a:prstGeom>
+          <a:ln>
+            <a:tailEnd type="triangle"/>
+          </a:ln>
+        </p:spPr>
+        <p:style>
+          <a:lnRef idx="1">
+            <a:schemeClr val="accent1"/>
+          </a:lnRef>
+          <a:fillRef idx="0">
+            <a:schemeClr val="accent1"/>
+          </a:fillRef>
+          <a:effectRef idx="0">
+            <a:schemeClr val="accent1"/>
+          </a:effectRef>
+          <a:fontRef idx="minor">
+            <a:schemeClr val="tx1"/>
+          </a:fontRef>
+        </p:style>
+      </p:cxnSp>
+      <p:cxnSp>
+        <p:nvCxnSpPr>
+          <p:cNvPr id="44" name="Straight Arrow Connector 43">
+            <a:extLst>
+              <a:ext uri="{FF2B5EF4-FFF2-40B4-BE49-F238E27FC236}">
+                <a16:creationId xmlns:a16="http://schemas.microsoft.com/office/drawing/2014/main" id="{4CB4D265-CA09-89A8-2DFC-827FA70BCAE7}"/>
+              </a:ext>
+            </a:extLst>
+          </p:cNvPr>
+          <p:cNvCxnSpPr>
+            <a:stCxn id="68" idx="2"/>
+            <a:endCxn id="64" idx="0"/>
+          </p:cNvCxnSpPr>
+          <p:nvPr/>
+        </p:nvCxnSpPr>
+        <p:spPr>
+          <a:xfrm>
+            <a:off x="4163911" y="5253791"/>
+            <a:ext cx="1006" cy="505324"/>
+          </a:xfrm>
+          <a:prstGeom prst="straightConnector1">
+            <a:avLst/>
+          </a:prstGeom>
+          <a:ln w="31750">
+            <a:solidFill>
+              <a:schemeClr val="tx1"/>
+            </a:solidFill>
+            <a:tailEnd type="triangle"/>
+          </a:ln>
+        </p:spPr>
+        <p:style>
+          <a:lnRef idx="1">
+            <a:schemeClr val="accent1"/>
+          </a:lnRef>
+          <a:fillRef idx="0">
+            <a:schemeClr val="accent1"/>
+          </a:fillRef>
+          <a:effectRef idx="0">
+            <a:schemeClr val="accent1"/>
+          </a:effectRef>
+          <a:fontRef idx="minor">
+            <a:schemeClr val="tx1"/>
+          </a:fontRef>
+        </p:style>
+      </p:cxnSp>
+      <p:cxnSp>
+        <p:nvCxnSpPr>
+          <p:cNvPr id="46" name="Straight Arrow Connector 45">
+            <a:extLst>
+              <a:ext uri="{FF2B5EF4-FFF2-40B4-BE49-F238E27FC236}">
+                <a16:creationId xmlns:a16="http://schemas.microsoft.com/office/drawing/2014/main" id="{A84CE82F-1407-91C3-CBD4-87598242C707}"/>
+              </a:ext>
+            </a:extLst>
+          </p:cNvPr>
+          <p:cNvCxnSpPr>
+            <a:stCxn id="66" idx="2"/>
+            <a:endCxn id="61" idx="0"/>
+          </p:cNvCxnSpPr>
+          <p:nvPr/>
+        </p:nvCxnSpPr>
+        <p:spPr>
+          <a:xfrm>
+            <a:off x="8421085" y="3561346"/>
+            <a:ext cx="11048" cy="276724"/>
+          </a:xfrm>
+          <a:prstGeom prst="straightConnector1">
+            <a:avLst/>
+          </a:prstGeom>
+          <a:ln w="31750">
+            <a:solidFill>
+              <a:schemeClr val="tx1"/>
+            </a:solidFill>
+            <a:tailEnd type="triangle"/>
+          </a:ln>
+        </p:spPr>
+        <p:style>
+          <a:lnRef idx="1">
+            <a:schemeClr val="accent1"/>
+          </a:lnRef>
+          <a:fillRef idx="0">
+            <a:schemeClr val="accent1"/>
+          </a:fillRef>
+          <a:effectRef idx="0">
+            <a:schemeClr val="accent1"/>
+          </a:effectRef>
+          <a:fontRef idx="minor">
+            <a:schemeClr val="tx1"/>
+          </a:fontRef>
+        </p:style>
+      </p:cxnSp>
+      <p:cxnSp>
+        <p:nvCxnSpPr>
+          <p:cNvPr id="48" name="Straight Arrow Connector 47">
+            <a:extLst>
+              <a:ext uri="{FF2B5EF4-FFF2-40B4-BE49-F238E27FC236}">
+                <a16:creationId xmlns:a16="http://schemas.microsoft.com/office/drawing/2014/main" id="{43B2A892-B1B9-A2C0-B0D4-CA0B3F68DA04}"/>
+              </a:ext>
+            </a:extLst>
+          </p:cNvPr>
+          <p:cNvCxnSpPr>
+            <a:cxnSpLocks/>
+            <a:endCxn id="7" idx="6"/>
+          </p:cNvCxnSpPr>
+          <p:nvPr/>
+        </p:nvCxnSpPr>
+        <p:spPr>
+          <a:xfrm flipH="1" flipV="1">
+            <a:off x="6825919" y="417094"/>
+            <a:ext cx="1828732" cy="207775"/>
+          </a:xfrm>
+          <a:prstGeom prst="straightConnector1">
+            <a:avLst/>
+          </a:prstGeom>
+          <a:ln>
+            <a:tailEnd type="triangle"/>
+          </a:ln>
+        </p:spPr>
+        <p:style>
+          <a:lnRef idx="1">
+            <a:schemeClr val="accent1"/>
+          </a:lnRef>
+          <a:fillRef idx="0">
+            <a:schemeClr val="accent1"/>
+          </a:fillRef>
+          <a:effectRef idx="0">
+            <a:schemeClr val="accent1"/>
+          </a:effectRef>
+          <a:fontRef idx="minor">
+            <a:schemeClr val="tx1"/>
+          </a:fontRef>
+        </p:style>
+      </p:cxnSp>
+      <p:cxnSp>
+        <p:nvCxnSpPr>
+          <p:cNvPr id="39936" name="Straight Arrow Connector 39935">
+            <a:extLst>
+              <a:ext uri="{FF2B5EF4-FFF2-40B4-BE49-F238E27FC236}">
+                <a16:creationId xmlns:a16="http://schemas.microsoft.com/office/drawing/2014/main" id="{80CDE6CD-1FF5-8E7F-270E-A4C68CE99BE6}"/>
+              </a:ext>
+            </a:extLst>
+          </p:cNvPr>
+          <p:cNvCxnSpPr>
+            <a:cxnSpLocks/>
+            <a:stCxn id="39937" idx="1"/>
+            <a:endCxn id="51" idx="7"/>
+          </p:cNvCxnSpPr>
+          <p:nvPr/>
+        </p:nvCxnSpPr>
+        <p:spPr>
+          <a:xfrm flipH="1">
+            <a:off x="6289386" y="781280"/>
+            <a:ext cx="2365265" cy="2712059"/>
+          </a:xfrm>
+          <a:prstGeom prst="straightConnector1">
+            <a:avLst/>
+          </a:prstGeom>
+          <a:ln>
+            <a:tailEnd type="triangle"/>
+          </a:ln>
+        </p:spPr>
+        <p:style>
+          <a:lnRef idx="1">
+            <a:schemeClr val="accent1"/>
+          </a:lnRef>
+          <a:fillRef idx="0">
+            <a:schemeClr val="accent1"/>
+          </a:fillRef>
+          <a:effectRef idx="0">
+            <a:schemeClr val="accent1"/>
+          </a:effectRef>
+          <a:fontRef idx="minor">
+            <a:schemeClr val="tx1"/>
+          </a:fontRef>
+        </p:style>
+      </p:cxnSp>
+      <p:sp>
+        <p:nvSpPr>
+          <p:cNvPr id="39937" name="TextBox 39936">
+            <a:extLst>
+              <a:ext uri="{FF2B5EF4-FFF2-40B4-BE49-F238E27FC236}">
+                <a16:creationId xmlns:a16="http://schemas.microsoft.com/office/drawing/2014/main" id="{8C48C167-22C7-7673-9E3B-75EAD4A7FA62}"/>
+              </a:ext>
+            </a:extLst>
+          </p:cNvPr>
+          <p:cNvSpPr txBox="1"/>
+          <p:nvPr/>
+        </p:nvSpPr>
+        <p:spPr>
+          <a:xfrm>
+            <a:off x="8654651" y="458114"/>
+            <a:ext cx="1589922" cy="646331"/>
+          </a:xfrm>
+          <a:prstGeom prst="rect">
+            <a:avLst/>
+          </a:prstGeom>
+          <a:noFill/>
+        </p:spPr>
+        <p:txBody>
+          <a:bodyPr wrap="none" rtlCol="0">
+            <a:spAutoFit/>
+          </a:bodyPr>
+          <a:lstStyle/>
+          <a:p>
+            <a:r>
+              <a:rPr lang="en-US" dirty="0"/>
+              <a:t>Organizational </a:t>
+            </a:r>
+          </a:p>
+          <a:p>
+            <a:r>
+              <a:rPr lang="en-US" dirty="0"/>
+              <a:t>Directories</a:t>
+            </a:r>
+          </a:p>
+        </p:txBody>
+      </p:sp>
+    </p:spTree>
+    <p:extLst>
+      <p:ext uri="{BB962C8B-B14F-4D97-AF65-F5344CB8AC3E}">
+        <p14:creationId xmlns:p14="http://schemas.microsoft.com/office/powerpoint/2010/main" val="4237897301"/>
       </p:ext>
     </p:extLst>
   </p:cSld>

</xml_diff>